<commit_message>
corrections in ppt file
</commit_message>
<xml_diff>
--- a/VQE_demo.pptx
+++ b/VQE_demo.pptx
@@ -10185,8 +10185,8 @@
           </a:p>
         </p:txBody>
       </p:sp>
-      <mc:AlternateContent xmlns:mc="http://schemas.openxmlformats.org/markup-compatibility/2006">
-        <mc:Choice xmlns:a14="http://schemas.microsoft.com/office/drawing/2010/main" Requires="a14">
+      <mc:AlternateContent xmlns:mc="http://schemas.openxmlformats.org/markup-compatibility/2006" xmlns:a14="http://schemas.microsoft.com/office/drawing/2010/main">
+        <mc:Choice Requires="a14">
           <p:sp>
             <p:nvSpPr>
               <p:cNvPr id="7" name="TextBox 6">
@@ -10244,7 +10244,7 @@
                               <m:begChr m:val="|"/>
                               <m:endChr m:val="|"/>
                               <m:ctrlPr>
-                                <a:rPr lang="en-IN">
+                                <a:rPr lang="en-IN" i="1">
                                   <a:latin typeface="Cambria Math" panose="02040503050406030204" pitchFamily="18" charset="0"/>
                                 </a:rPr>
                               </m:ctrlPr>
@@ -10385,7 +10385,7 @@
             </p:txBody>
           </p:sp>
         </mc:Choice>
-        <mc:Fallback>
+        <mc:Fallback xmlns="">
           <p:sp>
             <p:nvSpPr>
               <p:cNvPr id="7" name="TextBox 6">
@@ -11622,8 +11622,8 @@
             </a:p>
           </p:txBody>
         </p:sp>
-        <mc:AlternateContent xmlns:mc="http://schemas.openxmlformats.org/markup-compatibility/2006">
-          <mc:Choice xmlns:a14="http://schemas.microsoft.com/office/drawing/2010/main" Requires="a14">
+        <mc:AlternateContent xmlns:mc="http://schemas.openxmlformats.org/markup-compatibility/2006" xmlns:a14="http://schemas.microsoft.com/office/drawing/2010/main">
+          <mc:Choice Requires="a14">
             <p:sp>
               <p:nvSpPr>
                 <p:cNvPr id="21" name="TextBox 20">
@@ -11742,7 +11742,7 @@
                               <m:begChr m:val="|"/>
                               <m:endChr m:val="|"/>
                               <m:ctrlPr>
-                                <a:rPr lang="en-IN" sz="2400">
+                                <a:rPr lang="en-IN" sz="2400" i="1">
                                   <a:latin typeface="Cambria Math" panose="02040503050406030204" pitchFamily="18" charset="0"/>
                                 </a:rPr>
                               </m:ctrlPr>
@@ -11810,7 +11810,7 @@
               </p:txBody>
             </p:sp>
           </mc:Choice>
-          <mc:Fallback>
+          <mc:Fallback xmlns="">
             <p:sp>
               <p:nvSpPr>
                 <p:cNvPr id="21" name="TextBox 20">
@@ -17626,8 +17626,8 @@
             </p:sp>
           </mc:Fallback>
         </mc:AlternateContent>
-        <mc:AlternateContent xmlns:mc="http://schemas.openxmlformats.org/markup-compatibility/2006" xmlns:a14="http://schemas.microsoft.com/office/drawing/2010/main">
-          <mc:Choice Requires="a14">
+        <mc:AlternateContent xmlns:mc="http://schemas.openxmlformats.org/markup-compatibility/2006">
+          <mc:Choice xmlns:a14="http://schemas.microsoft.com/office/drawing/2010/main" Requires="a14">
             <p:sp>
               <p:nvSpPr>
                 <p:cNvPr id="57" name="TextBox 56">
@@ -17663,24 +17663,44 @@
                         <m:jc m:val="centerGroup"/>
                       </m:oMathParaPr>
                       <m:oMath xmlns:m="http://schemas.openxmlformats.org/officeDocument/2006/math">
-                        <m:r>
-                          <a:rPr lang="en-IN" sz="1600" i="1" smtClean="0">
-                            <a:latin typeface="Cambria Math" panose="02040503050406030204" pitchFamily="18" charset="0"/>
-                          </a:rPr>
-                          <m:t>|</m:t>
-                        </m:r>
-                        <m:r>
-                          <a:rPr lang="en-IN" sz="1600" b="0" i="1" smtClean="0">
-                            <a:latin typeface="Cambria Math" panose="02040503050406030204" pitchFamily="18" charset="0"/>
-                          </a:rPr>
-                          <m:t>𝜓</m:t>
-                        </m:r>
-                        <m:r>
-                          <a:rPr lang="en-IN" sz="1600" b="0" i="1" smtClean="0">
-                            <a:latin typeface="Cambria Math" panose="02040503050406030204" pitchFamily="18" charset="0"/>
-                          </a:rPr>
-                          <m:t>′⟩</m:t>
-                        </m:r>
+                        <m:d>
+                          <m:dPr>
+                            <m:begChr m:val="|"/>
+                            <m:endChr m:val="⟩"/>
+                            <m:ctrlPr>
+                              <a:rPr lang="en-IN" sz="1600" b="0" i="1" smtClean="0">
+                                <a:latin typeface="Cambria Math" panose="02040503050406030204" pitchFamily="18" charset="0"/>
+                              </a:rPr>
+                            </m:ctrlPr>
+                          </m:dPr>
+                          <m:e>
+                            <m:sSup>
+                              <m:sSupPr>
+                                <m:ctrlPr>
+                                  <a:rPr lang="en-IN" sz="1600" b="0" i="1" smtClean="0">
+                                    <a:latin typeface="Cambria Math" panose="02040503050406030204" pitchFamily="18" charset="0"/>
+                                  </a:rPr>
+                                </m:ctrlPr>
+                              </m:sSupPr>
+                              <m:e>
+                                <m:r>
+                                  <a:rPr lang="en-IN" sz="1600" b="0" i="1" smtClean="0">
+                                    <a:latin typeface="Cambria Math" panose="02040503050406030204" pitchFamily="18" charset="0"/>
+                                  </a:rPr>
+                                  <m:t>𝜓</m:t>
+                                </m:r>
+                              </m:e>
+                              <m:sup>
+                                <m:r>
+                                  <a:rPr lang="en-IN" sz="1600" b="0" i="1" smtClean="0">
+                                    <a:latin typeface="Cambria Math" panose="02040503050406030204" pitchFamily="18" charset="0"/>
+                                  </a:rPr>
+                                  <m:t>′</m:t>
+                                </m:r>
+                              </m:sup>
+                            </m:sSup>
+                          </m:e>
+                        </m:d>
                         <m:r>
                           <m:rPr>
                             <m:nor/>
@@ -17694,14 +17714,14 @@
                           </a:rPr>
                           <m:t>𝐻</m:t>
                         </m:r>
-                        <m:sSub>
-                          <m:sSubPr>
+                        <m:sSubSup>
+                          <m:sSubSupPr>
                             <m:ctrlPr>
-                              <a:rPr lang="en-IN" sz="1600" i="1">
+                              <a:rPr lang="en-US" sz="1600" b="0" i="1" smtClean="0">
                                 <a:latin typeface="Cambria Math" panose="02040503050406030204" pitchFamily="18" charset="0"/>
                               </a:rPr>
                             </m:ctrlPr>
-                          </m:sSubPr>
+                          </m:sSubSupPr>
                           <m:e>
                             <m:r>
                               <a:rPr lang="en-IN" sz="1600" i="1">
@@ -17718,7 +17738,15 @@
                               <m:t>𝑧</m:t>
                             </m:r>
                           </m:sub>
-                        </m:sSub>
+                          <m:sup>
+                            <m:r>
+                              <a:rPr lang="en-US" sz="1600" b="0" i="1" smtClean="0">
+                                <a:latin typeface="Cambria Math" panose="02040503050406030204" pitchFamily="18" charset="0"/>
+                              </a:rPr>
+                              <m:t>′</m:t>
+                            </m:r>
+                          </m:sup>
+                        </m:sSubSup>
                         <m:d>
                           <m:dPr>
                             <m:ctrlPr>
@@ -17781,7 +17809,7 @@
               </p:txBody>
             </p:sp>
           </mc:Choice>
-          <mc:Fallback xmlns="">
+          <mc:Fallback>
             <p:sp>
               <p:nvSpPr>
                 <p:cNvPr id="57" name="TextBox 56">
@@ -17807,7 +17835,7 @@
                 <a:blipFill>
                   <a:blip r:embed="rId11"/>
                   <a:stretch>
-                    <a:fillRect b="-2326"/>
+                    <a:fillRect/>
                   </a:stretch>
                 </a:blipFill>
               </p:spPr>
@@ -17816,7 +17844,7 @@
                 <a:lstStyle/>
                 <a:p>
                   <a:r>
-                    <a:rPr lang="en-IN">
+                    <a:rPr lang="en-US">
                       <a:noFill/>
                     </a:rPr>
                     <a:t> </a:t>
@@ -17826,8 +17854,8 @@
             </p:sp>
           </mc:Fallback>
         </mc:AlternateContent>
-        <mc:AlternateContent xmlns:mc="http://schemas.openxmlformats.org/markup-compatibility/2006" xmlns:a14="http://schemas.microsoft.com/office/drawing/2010/main">
-          <mc:Choice Requires="a14">
+        <mc:AlternateContent xmlns:mc="http://schemas.openxmlformats.org/markup-compatibility/2006">
+          <mc:Choice xmlns:a14="http://schemas.microsoft.com/office/drawing/2010/main" Requires="a14">
             <p:sp>
               <p:nvSpPr>
                 <p:cNvPr id="59" name="TextBox 58">
@@ -17945,14 +17973,14 @@
                                 </m:ctrlPr>
                               </m:dPr>
                               <m:e>
-                                <m:sSub>
-                                  <m:sSubPr>
+                                <m:sSubSup>
+                                  <m:sSubSupPr>
                                     <m:ctrlPr>
-                                      <a:rPr lang="en-IN" sz="1600" i="1">
+                                      <a:rPr lang="en-US" sz="1600" b="0" i="1" smtClean="0">
                                         <a:latin typeface="Cambria Math" panose="02040503050406030204" pitchFamily="18" charset="0"/>
                                       </a:rPr>
                                     </m:ctrlPr>
-                                  </m:sSubPr>
+                                  </m:sSubSupPr>
                                   <m:e>
                                     <m:r>
                                       <a:rPr lang="en-IN" sz="1600" i="1">
@@ -17969,7 +17997,15 @@
                                       <m:t>𝑧</m:t>
                                     </m:r>
                                   </m:sub>
-                                </m:sSub>
+                                  <m:sup>
+                                    <m:r>
+                                      <a:rPr lang="en-US" sz="1600" b="0" i="1" smtClean="0">
+                                        <a:latin typeface="Cambria Math" panose="02040503050406030204" pitchFamily="18" charset="0"/>
+                                      </a:rPr>
+                                      <m:t>′</m:t>
+                                    </m:r>
+                                  </m:sup>
+                                </m:sSubSup>
                                 <m:d>
                                   <m:dPr>
                                     <m:ctrlPr>
@@ -18018,14 +18054,14 @@
                                   </a:rPr>
                                   <m:t>𝐻</m:t>
                                 </m:r>
-                                <m:sSub>
-                                  <m:sSubPr>
+                                <m:sSubSup>
+                                  <m:sSubSupPr>
                                     <m:ctrlPr>
-                                      <a:rPr lang="en-IN" sz="1600" i="1">
+                                      <a:rPr lang="en-US" sz="1600" b="0" i="1" smtClean="0">
                                         <a:latin typeface="Cambria Math" panose="02040503050406030204" pitchFamily="18" charset="0"/>
                                       </a:rPr>
                                     </m:ctrlPr>
-                                  </m:sSubPr>
+                                  </m:sSubSupPr>
                                   <m:e>
                                     <m:r>
                                       <a:rPr lang="en-IN" sz="1600" i="1">
@@ -18042,7 +18078,15 @@
                                       <m:t>𝑧</m:t>
                                     </m:r>
                                   </m:sub>
-                                </m:sSub>
+                                  <m:sup>
+                                    <m:r>
+                                      <a:rPr lang="en-US" sz="1600" b="0" i="1" smtClean="0">
+                                        <a:latin typeface="Cambria Math" panose="02040503050406030204" pitchFamily="18" charset="0"/>
+                                      </a:rPr>
+                                      <m:t>′</m:t>
+                                    </m:r>
+                                  </m:sup>
+                                </m:sSubSup>
                                 <m:d>
                                   <m:dPr>
                                     <m:ctrlPr>
@@ -18165,7 +18209,7 @@
               </p:txBody>
             </p:sp>
           </mc:Choice>
-          <mc:Fallback xmlns="">
+          <mc:Fallback>
             <p:sp>
               <p:nvSpPr>
                 <p:cNvPr id="59" name="TextBox 58">
@@ -18200,7 +18244,7 @@
                 <a:lstStyle/>
                 <a:p>
                   <a:r>
-                    <a:rPr lang="en-IN">
+                    <a:rPr lang="en-US">
                       <a:noFill/>
                     </a:rPr>
                     <a:t> </a:t>
@@ -18907,8 +18951,8 @@
               </a:p>
             </p:txBody>
           </p:sp>
-          <mc:AlternateContent xmlns:mc="http://schemas.openxmlformats.org/markup-compatibility/2006" xmlns:a14="http://schemas.microsoft.com/office/drawing/2010/main">
-            <mc:Choice Requires="a14">
+          <mc:AlternateContent xmlns:mc="http://schemas.openxmlformats.org/markup-compatibility/2006">
+            <mc:Choice xmlns:a14="http://schemas.microsoft.com/office/drawing/2010/main" Requires="a14">
               <p:sp>
                 <p:nvSpPr>
                   <p:cNvPr id="42" name="TextBox 41">
@@ -18971,6 +19015,12 @@
                               </m:r>
                             </m:sub>
                           </m:sSub>
+                          <m:r>
+                            <a:rPr lang="en-US" sz="1400" b="1" i="1" smtClean="0">
+                              <a:latin typeface="Cambria Math" panose="02040503050406030204" pitchFamily="18" charset="0"/>
+                            </a:rPr>
+                            <m:t>′</m:t>
+                          </m:r>
                           <m:d>
                             <m:dPr>
                               <m:ctrlPr>
@@ -19015,7 +19065,7 @@
                 </p:txBody>
               </p:sp>
             </mc:Choice>
-            <mc:Fallback xmlns="">
+            <mc:Fallback>
               <p:sp>
                 <p:nvSpPr>
                   <p:cNvPr id="42" name="TextBox 41">
@@ -19041,7 +19091,7 @@
                   <a:blipFill>
                     <a:blip r:embed="rId16"/>
                     <a:stretch>
-                      <a:fillRect/>
+                      <a:fillRect b="-2632"/>
                     </a:stretch>
                   </a:blipFill>
                 </p:spPr>
@@ -19050,7 +19100,7 @@
                   <a:lstStyle/>
                   <a:p>
                     <a:r>
-                      <a:rPr lang="en-IN">
+                      <a:rPr lang="en-US">
                         <a:noFill/>
                       </a:rPr>
                       <a:t> </a:t>

</xml_diff>